<commit_message>
[Tutorial] Update button with style
Signed-off-by: Jiyun Yang <ji.yang@samsung.com>
</commit_message>
<xml_diff>
--- a/Tutorial/Components/2_Buttons_with_styles/button_styles_설명.pptx
+++ b/Tutorial/Components/2_Buttons_with_styles/button_styles_설명.pptx
@@ -3825,10 +3825,10 @@
       </p:grpSpPr>
       <p:pic>
         <p:nvPicPr>
-          <p:cNvPr id="3" name="그림 2">
-            <a:extLst>
-              <a:ext uri="{FF2B5EF4-FFF2-40B4-BE49-F238E27FC236}">
-                <a16:creationId xmlns:a16="http://schemas.microsoft.com/office/drawing/2014/main" id="{56038AA9-6C74-4C4A-8064-3A1CE3182C7B}"/>
+          <p:cNvPr id="4" name="그림 3">
+            <a:extLst>
+              <a:ext uri="{FF2B5EF4-FFF2-40B4-BE49-F238E27FC236}">
+                <a16:creationId xmlns:a16="http://schemas.microsoft.com/office/drawing/2014/main" id="{5AFF4C5E-987A-A942-B990-2D03011058EF}"/>
               </a:ext>
             </a:extLst>
           </p:cNvPr>
@@ -3867,7 +3867,7 @@
         </p:nvSpPr>
         <p:spPr>
           <a:xfrm>
-            <a:off x="866636" y="2895600"/>
+            <a:off x="866636" y="2998238"/>
             <a:ext cx="3596506" cy="166914"/>
           </a:xfrm>
           <a:prstGeom prst="rect">
@@ -3921,7 +3921,7 @@
         <p:spPr>
           <a:xfrm>
             <a:off x="6679608" y="2104571"/>
-            <a:ext cx="3785192" cy="1567340"/>
+            <a:ext cx="4349176" cy="1567340"/>
           </a:xfrm>
           <a:prstGeom prst="rect">
             <a:avLst/>
@@ -4158,64 +4158,6 @@
           </a:p>
         </p:txBody>
       </p:sp>
-      <p:pic>
-        <p:nvPicPr>
-          <p:cNvPr id="16" name="그림 15">
-            <a:extLst>
-              <a:ext uri="{FF2B5EF4-FFF2-40B4-BE49-F238E27FC236}">
-                <a16:creationId xmlns:a16="http://schemas.microsoft.com/office/drawing/2014/main" id="{02C1CF3C-A440-BC4C-B741-BF300E3B435A}"/>
-              </a:ext>
-            </a:extLst>
-          </p:cNvPr>
-          <p:cNvPicPr>
-            <a:picLocks noChangeAspect="1"/>
-          </p:cNvPicPr>
-          <p:nvPr/>
-        </p:nvPicPr>
-        <p:blipFill rotWithShape="1">
-          <a:blip r:embed="rId3"/>
-          <a:srcRect l="-324" t="12439" r="82074" b="78355"/>
-          <a:stretch/>
-        </p:blipFill>
-        <p:spPr>
-          <a:xfrm>
-            <a:off x="1137230" y="4234089"/>
-            <a:ext cx="2164786" cy="631371"/>
-          </a:xfrm>
-          <a:prstGeom prst="rect">
-            <a:avLst/>
-          </a:prstGeom>
-        </p:spPr>
-      </p:pic>
-      <p:pic>
-        <p:nvPicPr>
-          <p:cNvPr id="17" name="그림 16">
-            <a:extLst>
-              <a:ext uri="{FF2B5EF4-FFF2-40B4-BE49-F238E27FC236}">
-                <a16:creationId xmlns:a16="http://schemas.microsoft.com/office/drawing/2014/main" id="{795AD31F-0A19-DF4A-9730-39628B8E7558}"/>
-              </a:ext>
-            </a:extLst>
-          </p:cNvPr>
-          <p:cNvPicPr>
-            <a:picLocks noChangeAspect="1"/>
-          </p:cNvPicPr>
-          <p:nvPr/>
-        </p:nvPicPr>
-        <p:blipFill rotWithShape="1">
-          <a:blip r:embed="rId4"/>
-          <a:srcRect l="61" t="12642" r="82180" b="78258"/>
-          <a:stretch/>
-        </p:blipFill>
-        <p:spPr>
-          <a:xfrm>
-            <a:off x="3973491" y="4231922"/>
-            <a:ext cx="2106729" cy="624114"/>
-          </a:xfrm>
-          <a:prstGeom prst="rect">
-            <a:avLst/>
-          </a:prstGeom>
-        </p:spPr>
-      </p:pic>
       <p:sp>
         <p:nvSpPr>
           <p:cNvPr id="18" name="TextBox 17">
@@ -4288,6 +4230,64 @@
           </a:p>
         </p:txBody>
       </p:sp>
+      <p:pic>
+        <p:nvPicPr>
+          <p:cNvPr id="12" name="그림 11">
+            <a:extLst>
+              <a:ext uri="{FF2B5EF4-FFF2-40B4-BE49-F238E27FC236}">
+                <a16:creationId xmlns:a16="http://schemas.microsoft.com/office/drawing/2014/main" id="{59712836-BE66-B040-9C08-DD8C28CB4731}"/>
+              </a:ext>
+            </a:extLst>
+          </p:cNvPr>
+          <p:cNvPicPr>
+            <a:picLocks noChangeAspect="1"/>
+          </p:cNvPicPr>
+          <p:nvPr/>
+        </p:nvPicPr>
+        <p:blipFill rotWithShape="1">
+          <a:blip r:embed="rId3"/>
+          <a:srcRect l="94" t="13569" r="81525" b="76719"/>
+          <a:stretch/>
+        </p:blipFill>
+        <p:spPr>
+          <a:xfrm>
+            <a:off x="1232275" y="4178592"/>
+            <a:ext cx="2180534" cy="666119"/>
+          </a:xfrm>
+          <a:prstGeom prst="rect">
+            <a:avLst/>
+          </a:prstGeom>
+        </p:spPr>
+      </p:pic>
+      <p:pic>
+        <p:nvPicPr>
+          <p:cNvPr id="13" name="그림 12">
+            <a:extLst>
+              <a:ext uri="{FF2B5EF4-FFF2-40B4-BE49-F238E27FC236}">
+                <a16:creationId xmlns:a16="http://schemas.microsoft.com/office/drawing/2014/main" id="{1B6A4893-79BD-6D47-BCF0-653A7623F6F7}"/>
+              </a:ext>
+            </a:extLst>
+          </p:cNvPr>
+          <p:cNvPicPr>
+            <a:picLocks noChangeAspect="1"/>
+          </p:cNvPicPr>
+          <p:nvPr/>
+        </p:nvPicPr>
+        <p:blipFill rotWithShape="1">
+          <a:blip r:embed="rId4"/>
+          <a:srcRect l="78" t="13284" r="81390" b="76673"/>
+          <a:stretch/>
+        </p:blipFill>
+        <p:spPr>
+          <a:xfrm>
+            <a:off x="4002566" y="4167267"/>
+            <a:ext cx="2198432" cy="688768"/>
+          </a:xfrm>
+          <a:prstGeom prst="rect">
+            <a:avLst/>
+          </a:prstGeom>
+        </p:spPr>
+      </p:pic>
     </p:spTree>
     <p:extLst>
       <p:ext uri="{BB962C8B-B14F-4D97-AF65-F5344CB8AC3E}">
@@ -4411,10 +4411,10 @@
       </p:grpSpPr>
       <p:pic>
         <p:nvPicPr>
-          <p:cNvPr id="4" name="그림 3">
-            <a:extLst>
-              <a:ext uri="{FF2B5EF4-FFF2-40B4-BE49-F238E27FC236}">
-                <a16:creationId xmlns:a16="http://schemas.microsoft.com/office/drawing/2014/main" id="{E05777B2-16C8-6245-8E37-105B977D9AE0}"/>
+          <p:cNvPr id="3" name="그림 2">
+            <a:extLst>
+              <a:ext uri="{FF2B5EF4-FFF2-40B4-BE49-F238E27FC236}">
+                <a16:creationId xmlns:a16="http://schemas.microsoft.com/office/drawing/2014/main" id="{2936824B-E8D7-5049-A36E-5C0D7E0239E2}"/>
               </a:ext>
             </a:extLst>
           </p:cNvPr>
@@ -4453,7 +4453,7 @@
         </p:nvSpPr>
         <p:spPr>
           <a:xfrm>
-            <a:off x="7384751" y="391885"/>
+            <a:off x="7524710" y="371446"/>
             <a:ext cx="4371819" cy="3424039"/>
           </a:xfrm>
           <a:prstGeom prst="rect">
@@ -5188,8 +5188,8 @@
         </p:nvSpPr>
         <p:spPr>
           <a:xfrm>
-            <a:off x="6825351" y="4068704"/>
-            <a:ext cx="3568226" cy="636083"/>
+            <a:off x="6825351" y="4115359"/>
+            <a:ext cx="3568226" cy="540000"/>
           </a:xfrm>
           <a:prstGeom prst="rect">
             <a:avLst/>
@@ -5245,8 +5245,8 @@
         </p:nvCxnSpPr>
         <p:spPr>
           <a:xfrm rot="5400000" flipH="1" flipV="1">
-            <a:off x="8963672" y="3461716"/>
-            <a:ext cx="252780" cy="961197"/>
+            <a:off x="9000105" y="3404844"/>
+            <a:ext cx="319874" cy="1101156"/>
           </a:xfrm>
           <a:prstGeom prst="bentConnector3">
             <a:avLst>
@@ -5439,10 +5439,10 @@
       </p:grpSpPr>
       <p:pic>
         <p:nvPicPr>
-          <p:cNvPr id="10" name="그림 9">
-            <a:extLst>
-              <a:ext uri="{FF2B5EF4-FFF2-40B4-BE49-F238E27FC236}">
-                <a16:creationId xmlns:a16="http://schemas.microsoft.com/office/drawing/2014/main" id="{83D984E4-A94E-B949-BA9C-D3AF1CDE9FD4}"/>
+          <p:cNvPr id="11" name="그림 10">
+            <a:extLst>
+              <a:ext uri="{FF2B5EF4-FFF2-40B4-BE49-F238E27FC236}">
+                <a16:creationId xmlns:a16="http://schemas.microsoft.com/office/drawing/2014/main" id="{89FC0E3A-9672-B64F-ACA2-34D959F6272C}"/>
               </a:ext>
             </a:extLst>
           </p:cNvPr>
@@ -5481,7 +5481,7 @@
         </p:nvSpPr>
         <p:spPr>
           <a:xfrm>
-            <a:off x="866636" y="2975427"/>
+            <a:off x="866636" y="3096730"/>
             <a:ext cx="3596506" cy="166914"/>
           </a:xfrm>
           <a:prstGeom prst="rect">
@@ -6040,10 +6040,10 @@
       </p:grpSpPr>
       <p:pic>
         <p:nvPicPr>
-          <p:cNvPr id="38" name="그림 37">
-            <a:extLst>
-              <a:ext uri="{FF2B5EF4-FFF2-40B4-BE49-F238E27FC236}">
-                <a16:creationId xmlns:a16="http://schemas.microsoft.com/office/drawing/2014/main" id="{0D595635-7279-4742-A48A-FD8D9B4F57D3}"/>
+          <p:cNvPr id="5" name="그림 4">
+            <a:extLst>
+              <a:ext uri="{FF2B5EF4-FFF2-40B4-BE49-F238E27FC236}">
+                <a16:creationId xmlns:a16="http://schemas.microsoft.com/office/drawing/2014/main" id="{9407207B-B50F-FE48-B8AC-AF4E243EC092}"/>
               </a:ext>
             </a:extLst>
           </p:cNvPr>
@@ -7385,10 +7385,10 @@
       </p:grpSpPr>
       <p:pic>
         <p:nvPicPr>
-          <p:cNvPr id="15" name="그림 14">
-            <a:extLst>
-              <a:ext uri="{FF2B5EF4-FFF2-40B4-BE49-F238E27FC236}">
-                <a16:creationId xmlns:a16="http://schemas.microsoft.com/office/drawing/2014/main" id="{0A9DD054-7DCB-E941-BB5D-2E3DB12BF42C}"/>
+          <p:cNvPr id="10" name="그림 9">
+            <a:extLst>
+              <a:ext uri="{FF2B5EF4-FFF2-40B4-BE49-F238E27FC236}">
+                <a16:creationId xmlns:a16="http://schemas.microsoft.com/office/drawing/2014/main" id="{B4570BBC-A5AE-8747-B9E0-BB5BCBA44597}"/>
               </a:ext>
             </a:extLst>
           </p:cNvPr>
@@ -7427,7 +7427,7 @@
         </p:nvSpPr>
         <p:spPr>
           <a:xfrm>
-            <a:off x="866636" y="3069768"/>
+            <a:off x="866636" y="3209733"/>
             <a:ext cx="3596506" cy="166914"/>
           </a:xfrm>
           <a:prstGeom prst="rect">
@@ -7480,8 +7480,8 @@
         </p:nvSpPr>
         <p:spPr>
           <a:xfrm>
-            <a:off x="6665687" y="1677509"/>
-            <a:ext cx="4263569" cy="2255862"/>
+            <a:off x="6665687" y="1677508"/>
+            <a:ext cx="4263569" cy="2894491"/>
           </a:xfrm>
           <a:prstGeom prst="rect">
             <a:avLst/>
@@ -7533,7 +7533,7 @@
         </p:nvSpPr>
         <p:spPr>
           <a:xfrm>
-            <a:off x="934034" y="3294538"/>
+            <a:off x="934034" y="3425167"/>
             <a:ext cx="5492172" cy="2133601"/>
           </a:xfrm>
           <a:prstGeom prst="rect">
@@ -7739,7 +7739,7 @@
         </p:blipFill>
         <p:spPr>
           <a:xfrm>
-            <a:off x="1812925" y="4176233"/>
+            <a:off x="1812925" y="4306862"/>
             <a:ext cx="813396" cy="747383"/>
           </a:xfrm>
           <a:prstGeom prst="rect">
@@ -7761,7 +7761,7 @@
         </p:nvSpPr>
         <p:spPr>
           <a:xfrm>
-            <a:off x="1914091" y="4981472"/>
+            <a:off x="1914091" y="5112101"/>
             <a:ext cx="611065" cy="261610"/>
           </a:xfrm>
           <a:prstGeom prst="rect">
@@ -7797,7 +7797,7 @@
         </p:nvSpPr>
         <p:spPr>
           <a:xfrm>
-            <a:off x="4711706" y="4972048"/>
+            <a:off x="4711706" y="5102677"/>
             <a:ext cx="630301" cy="261610"/>
           </a:xfrm>
           <a:prstGeom prst="rect">
@@ -7841,7 +7841,7 @@
         </p:blipFill>
         <p:spPr>
           <a:xfrm>
-            <a:off x="4620456" y="4117620"/>
+            <a:off x="4620456" y="4248249"/>
             <a:ext cx="812800" cy="825500"/>
           </a:xfrm>
           <a:prstGeom prst="rect">
@@ -8058,10 +8058,10 @@
       </p:grpSpPr>
       <p:pic>
         <p:nvPicPr>
-          <p:cNvPr id="9" name="그림 8">
-            <a:extLst>
-              <a:ext uri="{FF2B5EF4-FFF2-40B4-BE49-F238E27FC236}">
-                <a16:creationId xmlns:a16="http://schemas.microsoft.com/office/drawing/2014/main" id="{BEE4D267-491C-9342-8023-9D922975A0C1}"/>
+          <p:cNvPr id="23" name="그림 22">
+            <a:extLst>
+              <a:ext uri="{FF2B5EF4-FFF2-40B4-BE49-F238E27FC236}">
+                <a16:creationId xmlns:a16="http://schemas.microsoft.com/office/drawing/2014/main" id="{FECB8D35-00BA-4F44-8045-A5399B870397}"/>
               </a:ext>
             </a:extLst>
           </p:cNvPr>
@@ -9437,10 +9437,10 @@
       </p:grpSpPr>
       <p:pic>
         <p:nvPicPr>
-          <p:cNvPr id="10" name="그림 9">
-            <a:extLst>
-              <a:ext uri="{FF2B5EF4-FFF2-40B4-BE49-F238E27FC236}">
-                <a16:creationId xmlns:a16="http://schemas.microsoft.com/office/drawing/2014/main" id="{0A8E6CE4-B609-524D-9DD7-E92D9D5F71C8}"/>
+          <p:cNvPr id="4" name="그림 3">
+            <a:extLst>
+              <a:ext uri="{FF2B5EF4-FFF2-40B4-BE49-F238E27FC236}">
+                <a16:creationId xmlns:a16="http://schemas.microsoft.com/office/drawing/2014/main" id="{3B23D03B-B751-B248-A74D-DCB1A04CB989}"/>
               </a:ext>
             </a:extLst>
           </p:cNvPr>
@@ -9479,8 +9479,8 @@
         </p:nvSpPr>
         <p:spPr>
           <a:xfrm>
-            <a:off x="866636" y="3262085"/>
-            <a:ext cx="3596506" cy="1026885"/>
+            <a:off x="866636" y="3429000"/>
+            <a:ext cx="3596506" cy="859970"/>
           </a:xfrm>
           <a:prstGeom prst="rect">
             <a:avLst/>
@@ -11558,10 +11558,10 @@
       </p:grpSpPr>
       <p:pic>
         <p:nvPicPr>
-          <p:cNvPr id="4" name="그림 3">
-            <a:extLst>
-              <a:ext uri="{FF2B5EF4-FFF2-40B4-BE49-F238E27FC236}">
-                <a16:creationId xmlns:a16="http://schemas.microsoft.com/office/drawing/2014/main" id="{20F124FD-9C7C-A84D-A03D-E4744234999D}"/>
+          <p:cNvPr id="3" name="그림 2">
+            <a:extLst>
+              <a:ext uri="{FF2B5EF4-FFF2-40B4-BE49-F238E27FC236}">
+                <a16:creationId xmlns:a16="http://schemas.microsoft.com/office/drawing/2014/main" id="{3BC77294-C74D-AE4F-B0E4-5F22ADB26930}"/>
               </a:ext>
             </a:extLst>
           </p:cNvPr>
@@ -12888,10 +12888,10 @@
       </p:grpSpPr>
       <p:pic>
         <p:nvPicPr>
-          <p:cNvPr id="4" name="그림 3">
-            <a:extLst>
-              <a:ext uri="{FF2B5EF4-FFF2-40B4-BE49-F238E27FC236}">
-                <a16:creationId xmlns:a16="http://schemas.microsoft.com/office/drawing/2014/main" id="{20F124FD-9C7C-A84D-A03D-E4744234999D}"/>
+          <p:cNvPr id="11" name="그림 10">
+            <a:extLst>
+              <a:ext uri="{FF2B5EF4-FFF2-40B4-BE49-F238E27FC236}">
+                <a16:creationId xmlns:a16="http://schemas.microsoft.com/office/drawing/2014/main" id="{C0505207-A266-3141-9D6D-050F36A28253}"/>
               </a:ext>
             </a:extLst>
           </p:cNvPr>
@@ -13253,64 +13253,6 @@
           </a:p>
         </p:txBody>
       </p:sp>
-      <p:pic>
-        <p:nvPicPr>
-          <p:cNvPr id="3" name="그림 2">
-            <a:extLst>
-              <a:ext uri="{FF2B5EF4-FFF2-40B4-BE49-F238E27FC236}">
-                <a16:creationId xmlns:a16="http://schemas.microsoft.com/office/drawing/2014/main" id="{5A06E9E5-4FD4-C54B-BB75-415B079DB997}"/>
-              </a:ext>
-            </a:extLst>
-          </p:cNvPr>
-          <p:cNvPicPr>
-            <a:picLocks noChangeAspect="1"/>
-          </p:cNvPicPr>
-          <p:nvPr/>
-        </p:nvPicPr>
-        <p:blipFill rotWithShape="1">
-          <a:blip r:embed="rId3"/>
-          <a:srcRect t="2752" r="81750" b="88042"/>
-          <a:stretch/>
-        </p:blipFill>
-        <p:spPr>
-          <a:xfrm>
-            <a:off x="2095174" y="4179911"/>
-            <a:ext cx="2164786" cy="631371"/>
-          </a:xfrm>
-          <a:prstGeom prst="rect">
-            <a:avLst/>
-          </a:prstGeom>
-        </p:spPr>
-      </p:pic>
-      <p:pic>
-        <p:nvPicPr>
-          <p:cNvPr id="7" name="그림 6">
-            <a:extLst>
-              <a:ext uri="{FF2B5EF4-FFF2-40B4-BE49-F238E27FC236}">
-                <a16:creationId xmlns:a16="http://schemas.microsoft.com/office/drawing/2014/main" id="{BF57AD27-51D4-9642-951A-5B3219E4DCDF}"/>
-              </a:ext>
-            </a:extLst>
-          </p:cNvPr>
-          <p:cNvPicPr>
-            <a:picLocks noChangeAspect="1"/>
-          </p:cNvPicPr>
-          <p:nvPr/>
-        </p:nvPicPr>
-        <p:blipFill rotWithShape="1">
-          <a:blip r:embed="rId4"/>
-          <a:srcRect t="2858" r="82241" b="88042"/>
-          <a:stretch/>
-        </p:blipFill>
-        <p:spPr>
-          <a:xfrm>
-            <a:off x="4921818" y="4179911"/>
-            <a:ext cx="2106729" cy="624114"/>
-          </a:xfrm>
-          <a:prstGeom prst="rect">
-            <a:avLst/>
-          </a:prstGeom>
-        </p:spPr>
-      </p:pic>
       <p:sp>
         <p:nvSpPr>
           <p:cNvPr id="8" name="TextBox 7">
@@ -13450,7 +13392,7 @@
         </p:nvSpPr>
         <p:spPr>
           <a:xfrm>
-            <a:off x="866636" y="2706422"/>
+            <a:off x="866636" y="2778340"/>
             <a:ext cx="3596506" cy="286946"/>
           </a:xfrm>
           <a:prstGeom prst="rect">
@@ -13489,6 +13431,64 @@
           </a:p>
         </p:txBody>
       </p:sp>
+      <p:pic>
+        <p:nvPicPr>
+          <p:cNvPr id="5" name="그림 4">
+            <a:extLst>
+              <a:ext uri="{FF2B5EF4-FFF2-40B4-BE49-F238E27FC236}">
+                <a16:creationId xmlns:a16="http://schemas.microsoft.com/office/drawing/2014/main" id="{FFA5F801-F211-4F44-9680-1C1D0B34E08E}"/>
+              </a:ext>
+            </a:extLst>
+          </p:cNvPr>
+          <p:cNvPicPr>
+            <a:picLocks noChangeAspect="1"/>
+          </p:cNvPicPr>
+          <p:nvPr/>
+        </p:nvPicPr>
+        <p:blipFill rotWithShape="1">
+          <a:blip r:embed="rId3"/>
+          <a:srcRect l="102" t="3241" r="81517" b="87047"/>
+          <a:stretch/>
+        </p:blipFill>
+        <p:spPr>
+          <a:xfrm>
+            <a:off x="2087299" y="4216164"/>
+            <a:ext cx="2180534" cy="666119"/>
+          </a:xfrm>
+          <a:prstGeom prst="rect">
+            <a:avLst/>
+          </a:prstGeom>
+        </p:spPr>
+      </p:pic>
+      <p:pic>
+        <p:nvPicPr>
+          <p:cNvPr id="9" name="그림 8">
+            <a:extLst>
+              <a:ext uri="{FF2B5EF4-FFF2-40B4-BE49-F238E27FC236}">
+                <a16:creationId xmlns:a16="http://schemas.microsoft.com/office/drawing/2014/main" id="{4200B8B0-8500-1B48-B12B-EB44EAC2A66C}"/>
+              </a:ext>
+            </a:extLst>
+          </p:cNvPr>
+          <p:cNvPicPr>
+            <a:picLocks noChangeAspect="1"/>
+          </p:cNvPicPr>
+          <p:nvPr/>
+        </p:nvPicPr>
+        <p:blipFill rotWithShape="1">
+          <a:blip r:embed="rId4"/>
+          <a:srcRect t="2944" r="81468" b="87013"/>
+          <a:stretch/>
+        </p:blipFill>
+        <p:spPr>
+          <a:xfrm>
+            <a:off x="4885583" y="4204839"/>
+            <a:ext cx="2198432" cy="688768"/>
+          </a:xfrm>
+          <a:prstGeom prst="rect">
+            <a:avLst/>
+          </a:prstGeom>
+        </p:spPr>
+      </p:pic>
     </p:spTree>
     <p:extLst>
       <p:ext uri="{BB962C8B-B14F-4D97-AF65-F5344CB8AC3E}">
@@ -13604,10 +13604,10 @@
       </p:grpSpPr>
       <p:pic>
         <p:nvPicPr>
-          <p:cNvPr id="3" name="그림 2">
-            <a:extLst>
-              <a:ext uri="{FF2B5EF4-FFF2-40B4-BE49-F238E27FC236}">
-                <a16:creationId xmlns:a16="http://schemas.microsoft.com/office/drawing/2014/main" id="{56038AA9-6C74-4C4A-8064-3A1CE3182C7B}"/>
+          <p:cNvPr id="4" name="그림 3">
+            <a:extLst>
+              <a:ext uri="{FF2B5EF4-FFF2-40B4-BE49-F238E27FC236}">
+                <a16:creationId xmlns:a16="http://schemas.microsoft.com/office/drawing/2014/main" id="{3F582CD6-301F-6847-AAFE-345C7743427E}"/>
               </a:ext>
             </a:extLst>
           </p:cNvPr>
@@ -13736,7 +13736,7 @@
                   </a:schemeClr>
                 </a:solidFill>
               </a:rPr>
-              <a:t>0</a:t>
+              <a:t>10</a:t>
             </a:r>
             <a:r>
               <a:rPr kumimoji="1" lang="ko-KR" altLang="en-US" sz="1100" dirty="0">
@@ -14213,7 +14213,7 @@
         <p:spPr>
           <a:xfrm>
             <a:off x="6799645" y="2791409"/>
-            <a:ext cx="3568226" cy="756000"/>
+            <a:ext cx="4090028" cy="756000"/>
           </a:xfrm>
           <a:prstGeom prst="rect">
             <a:avLst/>
@@ -14266,7 +14266,7 @@
         <p:spPr>
           <a:xfrm>
             <a:off x="6809923" y="2339893"/>
-            <a:ext cx="3568226" cy="451516"/>
+            <a:ext cx="3756630" cy="451516"/>
           </a:xfrm>
           <a:prstGeom prst="rect">
             <a:avLst/>
@@ -14322,8 +14322,8 @@
         </p:nvCxnSpPr>
         <p:spPr>
           <a:xfrm rot="5400000" flipH="1" flipV="1">
-            <a:off x="8552893" y="2027578"/>
-            <a:ext cx="353459" cy="271172"/>
+            <a:off x="8599994" y="2074679"/>
+            <a:ext cx="353459" cy="176970"/>
           </a:xfrm>
           <a:prstGeom prst="bentConnector2">
             <a:avLst/>
@@ -14369,8 +14369,8 @@
         </p:nvCxnSpPr>
         <p:spPr>
           <a:xfrm rot="16200000" flipH="1">
-            <a:off x="8357928" y="3773238"/>
-            <a:ext cx="939330" cy="487671"/>
+            <a:off x="8488379" y="3903689"/>
+            <a:ext cx="939330" cy="226770"/>
           </a:xfrm>
           <a:prstGeom prst="bentConnector2">
             <a:avLst/>
@@ -14413,7 +14413,7 @@
         <p:spPr>
           <a:xfrm>
             <a:off x="5198441" y="4299842"/>
-            <a:ext cx="2949096" cy="1046633"/>
+            <a:ext cx="2949096" cy="1482387"/>
           </a:xfrm>
           <a:prstGeom prst="rect">
             <a:avLst/>
@@ -14548,7 +14548,7 @@
                   </a:schemeClr>
                 </a:solidFill>
               </a:rPr>
-              <a:t>상태일땐 검은색</a:t>
+              <a:t>상태일 땐 검은색</a:t>
             </a:r>
             <a:r>
               <a:rPr kumimoji="1" lang="en-US" altLang="ko-KR" sz="1100" dirty="0">
@@ -14616,6 +14616,95 @@
               </a:solidFill>
             </a:endParaRPr>
           </a:p>
+          <a:p>
+            <a:r>
+              <a:rPr kumimoji="1" lang="en-US" altLang="ko-KR" sz="1100" dirty="0">
+                <a:solidFill>
+                  <a:schemeClr val="tx1">
+                    <a:lumMod val="75000"/>
+                    <a:lumOff val="25000"/>
+                  </a:schemeClr>
+                </a:solidFill>
+              </a:rPr>
+              <a:t>(</a:t>
+            </a:r>
+            <a:r>
+              <a:rPr kumimoji="1" lang="ko-KR" altLang="en-US" sz="1100" dirty="0">
+                <a:solidFill>
+                  <a:schemeClr val="tx1">
+                    <a:lumMod val="75000"/>
+                    <a:lumOff val="25000"/>
+                  </a:schemeClr>
+                </a:solidFill>
+              </a:rPr>
+              <a:t>참고로 </a:t>
+            </a:r>
+            <a:r>
+              <a:rPr kumimoji="1" lang="en-US" altLang="ko-KR" sz="1100" dirty="0">
+                <a:solidFill>
+                  <a:schemeClr val="tx1">
+                    <a:lumMod val="75000"/>
+                    <a:lumOff val="25000"/>
+                  </a:schemeClr>
+                </a:solidFill>
+              </a:rPr>
+              <a:t>8</a:t>
+            </a:r>
+            <a:r>
+              <a:rPr kumimoji="1" lang="ko-KR" altLang="en-US" sz="1100" dirty="0">
+                <a:solidFill>
+                  <a:schemeClr val="tx1">
+                    <a:lumMod val="75000"/>
+                    <a:lumOff val="25000"/>
+                  </a:schemeClr>
+                </a:solidFill>
+              </a:rPr>
+              <a:t>자리 </a:t>
+            </a:r>
+            <a:r>
+              <a:rPr kumimoji="1" lang="en-US" altLang="ko-KR" sz="1100" dirty="0">
+                <a:solidFill>
+                  <a:schemeClr val="tx1">
+                    <a:lumMod val="75000"/>
+                    <a:lumOff val="25000"/>
+                  </a:schemeClr>
+                </a:solidFill>
+              </a:rPr>
+              <a:t>Hex</a:t>
+            </a:r>
+            <a:r>
+              <a:rPr kumimoji="1" lang="ko-KR" altLang="en-US" sz="1100" dirty="0">
+                <a:solidFill>
+                  <a:schemeClr val="tx1">
+                    <a:lumMod val="75000"/>
+                    <a:lumOff val="25000"/>
+                  </a:schemeClr>
+                </a:solidFill>
+              </a:rPr>
+              <a:t>컬러 표기때 마지막 두자리는 투명도를 나타냅니다</a:t>
+            </a:r>
+            <a:r>
+              <a:rPr kumimoji="1" lang="en-US" altLang="ko-KR" sz="1100" dirty="0">
+                <a:solidFill>
+                  <a:schemeClr val="tx1">
+                    <a:lumMod val="75000"/>
+                    <a:lumOff val="25000"/>
+                  </a:schemeClr>
+                </a:solidFill>
+              </a:rPr>
+              <a:t>. )</a:t>
+            </a:r>
+          </a:p>
+          <a:p>
+            <a:endParaRPr kumimoji="1" lang="en-US" altLang="ko-KR" sz="1100" dirty="0">
+              <a:solidFill>
+                <a:schemeClr val="tx1">
+                  <a:lumMod val="75000"/>
+                  <a:lumOff val="25000"/>
+                </a:schemeClr>
+              </a:solidFill>
+            </a:endParaRPr>
+          </a:p>
         </p:txBody>
       </p:sp>
       <p:cxnSp>
@@ -14635,12 +14724,12 @@
         </p:nvCxnSpPr>
         <p:spPr>
           <a:xfrm rot="16200000" flipH="1">
-            <a:off x="7335449" y="4011071"/>
-            <a:ext cx="1495780" cy="128395"/>
+            <a:off x="7226510" y="4120009"/>
+            <a:ext cx="1713658" cy="128395"/>
           </a:xfrm>
           <a:prstGeom prst="bentConnector4">
             <a:avLst>
-              <a:gd name="adj1" fmla="val 32507"/>
+              <a:gd name="adj1" fmla="val 28374"/>
               <a:gd name="adj2" fmla="val 278044"/>
             </a:avLst>
           </a:prstGeom>

</xml_diff>